<commit_message>
Style for wally game
</commit_message>
<xml_diff>
--- a/plan/Where’s Wally.pptx
+++ b/plan/Where’s Wally.pptx
@@ -9,6 +9,9 @@
     <p:sldId id="257" r:id="rId3"/>
     <p:sldId id="258" r:id="rId4"/>
     <p:sldId id="259" r:id="rId5"/>
+    <p:sldId id="260" r:id="rId6"/>
+    <p:sldId id="261" r:id="rId7"/>
+    <p:sldId id="262" r:id="rId8"/>
   </p:sldIdLst>
   <p:sldSz cx="12192000" cy="6858000"/>
   <p:notesSz cx="6858000" cy="9144000"/>
@@ -273,7 +276,7 @@
           <a:p>
             <a:fld id="{07316937-9BBB-49D0-AFC6-014B7C792571}" type="datetimeFigureOut">
               <a:rPr lang="en-US" smtClean="0"/>
-              <a:t>8/16/2021</a:t>
+              <a:t>8/17/2021</a:t>
             </a:fld>
             <a:endParaRPr lang="en-US"/>
           </a:p>
@@ -471,7 +474,7 @@
           <a:p>
             <a:fld id="{07316937-9BBB-49D0-AFC6-014B7C792571}" type="datetimeFigureOut">
               <a:rPr lang="en-US" smtClean="0"/>
-              <a:t>8/16/2021</a:t>
+              <a:t>8/17/2021</a:t>
             </a:fld>
             <a:endParaRPr lang="en-US"/>
           </a:p>
@@ -679,7 +682,7 @@
           <a:p>
             <a:fld id="{07316937-9BBB-49D0-AFC6-014B7C792571}" type="datetimeFigureOut">
               <a:rPr lang="en-US" smtClean="0"/>
-              <a:t>8/16/2021</a:t>
+              <a:t>8/17/2021</a:t>
             </a:fld>
             <a:endParaRPr lang="en-US"/>
           </a:p>
@@ -877,7 +880,7 @@
           <a:p>
             <a:fld id="{07316937-9BBB-49D0-AFC6-014B7C792571}" type="datetimeFigureOut">
               <a:rPr lang="en-US" smtClean="0"/>
-              <a:t>8/16/2021</a:t>
+              <a:t>8/17/2021</a:t>
             </a:fld>
             <a:endParaRPr lang="en-US"/>
           </a:p>
@@ -1152,7 +1155,7 @@
           <a:p>
             <a:fld id="{07316937-9BBB-49D0-AFC6-014B7C792571}" type="datetimeFigureOut">
               <a:rPr lang="en-US" smtClean="0"/>
-              <a:t>8/16/2021</a:t>
+              <a:t>8/17/2021</a:t>
             </a:fld>
             <a:endParaRPr lang="en-US"/>
           </a:p>
@@ -1417,7 +1420,7 @@
           <a:p>
             <a:fld id="{07316937-9BBB-49D0-AFC6-014B7C792571}" type="datetimeFigureOut">
               <a:rPr lang="en-US" smtClean="0"/>
-              <a:t>8/16/2021</a:t>
+              <a:t>8/17/2021</a:t>
             </a:fld>
             <a:endParaRPr lang="en-US"/>
           </a:p>
@@ -1829,7 +1832,7 @@
           <a:p>
             <a:fld id="{07316937-9BBB-49D0-AFC6-014B7C792571}" type="datetimeFigureOut">
               <a:rPr lang="en-US" smtClean="0"/>
-              <a:t>8/16/2021</a:t>
+              <a:t>8/17/2021</a:t>
             </a:fld>
             <a:endParaRPr lang="en-US"/>
           </a:p>
@@ -1970,7 +1973,7 @@
           <a:p>
             <a:fld id="{07316937-9BBB-49D0-AFC6-014B7C792571}" type="datetimeFigureOut">
               <a:rPr lang="en-US" smtClean="0"/>
-              <a:t>8/16/2021</a:t>
+              <a:t>8/17/2021</a:t>
             </a:fld>
             <a:endParaRPr lang="en-US"/>
           </a:p>
@@ -2083,7 +2086,7 @@
           <a:p>
             <a:fld id="{07316937-9BBB-49D0-AFC6-014B7C792571}" type="datetimeFigureOut">
               <a:rPr lang="en-US" smtClean="0"/>
-              <a:t>8/16/2021</a:t>
+              <a:t>8/17/2021</a:t>
             </a:fld>
             <a:endParaRPr lang="en-US"/>
           </a:p>
@@ -2394,7 +2397,7 @@
           <a:p>
             <a:fld id="{07316937-9BBB-49D0-AFC6-014B7C792571}" type="datetimeFigureOut">
               <a:rPr lang="en-US" smtClean="0"/>
-              <a:t>8/16/2021</a:t>
+              <a:t>8/17/2021</a:t>
             </a:fld>
             <a:endParaRPr lang="en-US"/>
           </a:p>
@@ -2682,7 +2685,7 @@
           <a:p>
             <a:fld id="{07316937-9BBB-49D0-AFC6-014B7C792571}" type="datetimeFigureOut">
               <a:rPr lang="en-US" smtClean="0"/>
-              <a:t>8/16/2021</a:t>
+              <a:t>8/17/2021</a:t>
             </a:fld>
             <a:endParaRPr lang="en-US"/>
           </a:p>
@@ -2923,7 +2926,7 @@
           <a:p>
             <a:fld id="{07316937-9BBB-49D0-AFC6-014B7C792571}" type="datetimeFigureOut">
               <a:rPr lang="en-US" smtClean="0"/>
-              <a:t>8/16/2021</a:t>
+              <a:t>8/17/2021</a:t>
             </a:fld>
             <a:endParaRPr lang="en-US"/>
           </a:p>
@@ -4116,6 +4119,765 @@
 </p:sld>
 </file>
 
+<file path=ppt/slides/slide5.xml><?xml version="1.0" encoding="utf-8"?>
+<p:sld xmlns:a="http://schemas.openxmlformats.org/drawingml/2006/main" xmlns:r="http://schemas.openxmlformats.org/officeDocument/2006/relationships" xmlns:p="http://schemas.openxmlformats.org/presentationml/2006/main">
+  <p:cSld>
+    <p:spTree>
+      <p:nvGrpSpPr>
+        <p:cNvPr id="1" name=""/>
+        <p:cNvGrpSpPr/>
+        <p:nvPr/>
+      </p:nvGrpSpPr>
+      <p:grpSpPr>
+        <a:xfrm>
+          <a:off x="0" y="0"/>
+          <a:ext cx="0" cy="0"/>
+          <a:chOff x="0" y="0"/>
+          <a:chExt cx="0" cy="0"/>
+        </a:xfrm>
+      </p:grpSpPr>
+      <p:pic>
+        <p:nvPicPr>
+          <p:cNvPr id="9" name="Picture 8" descr="A picture containing background pattern&#10;&#10;Description automatically generated">
+            <a:extLst>
+              <a:ext uri="{FF2B5EF4-FFF2-40B4-BE49-F238E27FC236}">
+                <a16:creationId xmlns:a16="http://schemas.microsoft.com/office/drawing/2014/main" id="{8414EBA2-3AED-4A24-8EB2-DF00F9BCD8E1}"/>
+              </a:ext>
+            </a:extLst>
+          </p:cNvPr>
+          <p:cNvPicPr>
+            <a:picLocks noChangeAspect="1"/>
+          </p:cNvPicPr>
+          <p:nvPr/>
+        </p:nvPicPr>
+        <p:blipFill>
+          <a:blip r:embed="rId2">
+            <a:extLst>
+              <a:ext uri="{28A0092B-C50C-407E-A947-70E740481C1C}">
+                <a14:useLocalDpi xmlns:a14="http://schemas.microsoft.com/office/drawing/2010/main" val="0"/>
+              </a:ext>
+            </a:extLst>
+          </a:blip>
+          <a:stretch>
+            <a:fillRect/>
+          </a:stretch>
+        </p:blipFill>
+        <p:spPr>
+          <a:xfrm>
+            <a:off x="0" y="0"/>
+            <a:ext cx="12192000" cy="6858000"/>
+          </a:xfrm>
+          <a:prstGeom prst="rect">
+            <a:avLst/>
+          </a:prstGeom>
+        </p:spPr>
+      </p:pic>
+      <p:grpSp>
+        <p:nvGrpSpPr>
+          <p:cNvPr id="7" name="Group 6">
+            <a:extLst>
+              <a:ext uri="{FF2B5EF4-FFF2-40B4-BE49-F238E27FC236}">
+                <a16:creationId xmlns:a16="http://schemas.microsoft.com/office/drawing/2014/main" id="{E6F0BEBA-E3F4-43FD-87D9-6EAE2DAE5BF2}"/>
+              </a:ext>
+            </a:extLst>
+          </p:cNvPr>
+          <p:cNvGrpSpPr/>
+          <p:nvPr/>
+        </p:nvGrpSpPr>
+        <p:grpSpPr>
+          <a:xfrm>
+            <a:off x="2939143" y="298580"/>
+            <a:ext cx="6130212" cy="2743200"/>
+            <a:chOff x="2939143" y="298580"/>
+            <a:chExt cx="6130212" cy="2743200"/>
+          </a:xfrm>
+        </p:grpSpPr>
+        <p:sp>
+          <p:nvSpPr>
+            <p:cNvPr id="6" name="TextBox 5">
+              <a:extLst>
+                <a:ext uri="{FF2B5EF4-FFF2-40B4-BE49-F238E27FC236}">
+                  <a16:creationId xmlns:a16="http://schemas.microsoft.com/office/drawing/2014/main" id="{539F4A97-3F5C-45AE-8801-D84F791F40BB}"/>
+                </a:ext>
+              </a:extLst>
+            </p:cNvPr>
+            <p:cNvSpPr txBox="1"/>
+            <p:nvPr/>
+          </p:nvSpPr>
+          <p:spPr>
+            <a:xfrm>
+              <a:off x="2939143" y="298580"/>
+              <a:ext cx="6130212" cy="2743200"/>
+            </a:xfrm>
+            <a:prstGeom prst="rect">
+              <a:avLst/>
+            </a:prstGeom>
+            <a:noFill/>
+            <a:ln w="28575">
+              <a:solidFill>
+                <a:schemeClr val="tx1">
+                  <a:lumMod val="85000"/>
+                  <a:lumOff val="15000"/>
+                </a:schemeClr>
+              </a:solidFill>
+            </a:ln>
+          </p:spPr>
+          <p:txBody>
+            <a:bodyPr wrap="square" rtlCol="0">
+              <a:spAutoFit/>
+            </a:bodyPr>
+            <a:lstStyle/>
+            <a:p>
+              <a:endParaRPr lang="en-US" dirty="0"/>
+            </a:p>
+          </p:txBody>
+        </p:sp>
+        <p:sp>
+          <p:nvSpPr>
+            <p:cNvPr id="3" name="TextBox 2">
+              <a:extLst>
+                <a:ext uri="{FF2B5EF4-FFF2-40B4-BE49-F238E27FC236}">
+                  <a16:creationId xmlns:a16="http://schemas.microsoft.com/office/drawing/2014/main" id="{62FD18FB-4038-4FA3-840C-9C8D39F1394C}"/>
+                </a:ext>
+              </a:extLst>
+            </p:cNvPr>
+            <p:cNvSpPr txBox="1"/>
+            <p:nvPr/>
+          </p:nvSpPr>
+          <p:spPr>
+            <a:xfrm>
+              <a:off x="4971661" y="550507"/>
+              <a:ext cx="2063621" cy="707886"/>
+            </a:xfrm>
+            <a:prstGeom prst="rect">
+              <a:avLst/>
+            </a:prstGeom>
+            <a:noFill/>
+            <a:ln>
+              <a:solidFill>
+                <a:schemeClr val="tx1"/>
+              </a:solidFill>
+            </a:ln>
+          </p:spPr>
+          <p:txBody>
+            <a:bodyPr wrap="square" rtlCol="0">
+              <a:spAutoFit/>
+            </a:bodyPr>
+            <a:lstStyle/>
+            <a:p>
+              <a:r>
+                <a:rPr lang="en-US" sz="4000" dirty="0"/>
+                <a:t> Level 01</a:t>
+              </a:r>
+            </a:p>
+          </p:txBody>
+        </p:sp>
+        <p:sp>
+          <p:nvSpPr>
+            <p:cNvPr id="4" name="TextBox 3">
+              <a:extLst>
+                <a:ext uri="{FF2B5EF4-FFF2-40B4-BE49-F238E27FC236}">
+                  <a16:creationId xmlns:a16="http://schemas.microsoft.com/office/drawing/2014/main" id="{12738E80-E640-411C-816B-A58A1E6C02D8}"/>
+                </a:ext>
+              </a:extLst>
+            </p:cNvPr>
+            <p:cNvSpPr txBox="1"/>
+            <p:nvPr/>
+          </p:nvSpPr>
+          <p:spPr>
+            <a:xfrm>
+              <a:off x="5545494" y="1539551"/>
+              <a:ext cx="1004596" cy="523220"/>
+            </a:xfrm>
+            <a:prstGeom prst="rect">
+              <a:avLst/>
+            </a:prstGeom>
+            <a:noFill/>
+            <a:ln>
+              <a:solidFill>
+                <a:schemeClr val="tx1"/>
+              </a:solidFill>
+            </a:ln>
+          </p:spPr>
+          <p:txBody>
+            <a:bodyPr wrap="square" rtlCol="0">
+              <a:spAutoFit/>
+            </a:bodyPr>
+            <a:lstStyle/>
+            <a:p>
+              <a:r>
+                <a:rPr lang="en-US" sz="2800" dirty="0"/>
+                <a:t>00:59</a:t>
+              </a:r>
+            </a:p>
+          </p:txBody>
+        </p:sp>
+        <p:sp>
+          <p:nvSpPr>
+            <p:cNvPr id="5" name="TextBox 4">
+              <a:extLst>
+                <a:ext uri="{FF2B5EF4-FFF2-40B4-BE49-F238E27FC236}">
+                  <a16:creationId xmlns:a16="http://schemas.microsoft.com/office/drawing/2014/main" id="{E9D2CFC5-458E-46AB-AFAF-42AE7C199207}"/>
+                </a:ext>
+              </a:extLst>
+            </p:cNvPr>
+            <p:cNvSpPr txBox="1"/>
+            <p:nvPr/>
+          </p:nvSpPr>
+          <p:spPr>
+            <a:xfrm>
+              <a:off x="5747657" y="2343929"/>
+              <a:ext cx="531845" cy="584775"/>
+            </a:xfrm>
+            <a:prstGeom prst="rect">
+              <a:avLst/>
+            </a:prstGeom>
+            <a:noFill/>
+          </p:spPr>
+          <p:txBody>
+            <a:bodyPr wrap="square" rtlCol="0">
+              <a:spAutoFit/>
+            </a:bodyPr>
+            <a:lstStyle/>
+            <a:p>
+              <a:r>
+                <a:rPr lang="ko-KR" altLang="en-US" sz="3200" dirty="0"/>
+                <a:t>♦</a:t>
+              </a:r>
+              <a:endParaRPr lang="en-US" sz="3200" dirty="0"/>
+            </a:p>
+          </p:txBody>
+        </p:sp>
+      </p:grpSp>
+    </p:spTree>
+    <p:extLst>
+      <p:ext uri="{BB962C8B-B14F-4D97-AF65-F5344CB8AC3E}">
+        <p14:creationId xmlns:p14="http://schemas.microsoft.com/office/powerpoint/2010/main" val="2297639117"/>
+      </p:ext>
+    </p:extLst>
+  </p:cSld>
+  <p:clrMapOvr>
+    <a:masterClrMapping/>
+  </p:clrMapOvr>
+  <p:timing>
+    <p:tnLst>
+      <p:par>
+        <p:cTn id="1" dur="indefinite" restart="never" nodeType="tmRoot">
+          <p:childTnLst>
+            <p:seq concurrent="1" nextAc="seek">
+              <p:cTn id="2" dur="indefinite" nodeType="mainSeq">
+                <p:childTnLst>
+                  <p:par>
+                    <p:cTn id="3" fill="hold">
+                      <p:stCondLst>
+                        <p:cond delay="indefinite"/>
+                      </p:stCondLst>
+                      <p:childTnLst>
+                        <p:par>
+                          <p:cTn id="4" fill="hold">
+                            <p:stCondLst>
+                              <p:cond delay="0"/>
+                            </p:stCondLst>
+                            <p:childTnLst>
+                              <p:par>
+                                <p:cTn id="5" presetID="1" presetClass="entr" presetSubtype="0" fill="hold" nodeType="clickEffect">
+                                  <p:stCondLst>
+                                    <p:cond delay="0"/>
+                                  </p:stCondLst>
+                                  <p:childTnLst>
+                                    <p:set>
+                                      <p:cBhvr>
+                                        <p:cTn id="6" dur="1" fill="hold">
+                                          <p:stCondLst>
+                                            <p:cond delay="0"/>
+                                          </p:stCondLst>
+                                        </p:cTn>
+                                        <p:tgtEl>
+                                          <p:spTgt spid="7"/>
+                                        </p:tgtEl>
+                                        <p:attrNameLst>
+                                          <p:attrName>style.visibility</p:attrName>
+                                        </p:attrNameLst>
+                                      </p:cBhvr>
+                                      <p:to>
+                                        <p:strVal val="visible"/>
+                                      </p:to>
+                                    </p:set>
+                                  </p:childTnLst>
+                                </p:cTn>
+                              </p:par>
+                            </p:childTnLst>
+                          </p:cTn>
+                        </p:par>
+                      </p:childTnLst>
+                    </p:cTn>
+                  </p:par>
+                  <p:par>
+                    <p:cTn id="7" fill="hold">
+                      <p:stCondLst>
+                        <p:cond delay="indefinite"/>
+                      </p:stCondLst>
+                      <p:childTnLst>
+                        <p:par>
+                          <p:cTn id="8" fill="hold">
+                            <p:stCondLst>
+                              <p:cond delay="0"/>
+                            </p:stCondLst>
+                            <p:childTnLst>
+                              <p:par>
+                                <p:cTn id="9" presetID="1" presetClass="entr" presetSubtype="0" fill="hold" nodeType="clickEffect">
+                                  <p:stCondLst>
+                                    <p:cond delay="0"/>
+                                  </p:stCondLst>
+                                  <p:childTnLst>
+                                    <p:set>
+                                      <p:cBhvr>
+                                        <p:cTn id="10" dur="1" fill="hold">
+                                          <p:stCondLst>
+                                            <p:cond delay="0"/>
+                                          </p:stCondLst>
+                                        </p:cTn>
+                                        <p:tgtEl>
+                                          <p:spTgt spid="9"/>
+                                        </p:tgtEl>
+                                        <p:attrNameLst>
+                                          <p:attrName>style.visibility</p:attrName>
+                                        </p:attrNameLst>
+                                      </p:cBhvr>
+                                      <p:to>
+                                        <p:strVal val="visible"/>
+                                      </p:to>
+                                    </p:set>
+                                  </p:childTnLst>
+                                </p:cTn>
+                              </p:par>
+                            </p:childTnLst>
+                          </p:cTn>
+                        </p:par>
+                      </p:childTnLst>
+                    </p:cTn>
+                  </p:par>
+                </p:childTnLst>
+              </p:cTn>
+              <p:prevCondLst>
+                <p:cond evt="onPrev" delay="0">
+                  <p:tgtEl>
+                    <p:sldTgt/>
+                  </p:tgtEl>
+                </p:cond>
+              </p:prevCondLst>
+              <p:nextCondLst>
+                <p:cond evt="onNext" delay="0">
+                  <p:tgtEl>
+                    <p:sldTgt/>
+                  </p:tgtEl>
+                </p:cond>
+              </p:nextCondLst>
+            </p:seq>
+          </p:childTnLst>
+        </p:cTn>
+      </p:par>
+    </p:tnLst>
+  </p:timing>
+</p:sld>
+</file>
+
+<file path=ppt/slides/slide6.xml><?xml version="1.0" encoding="utf-8"?>
+<p:sld xmlns:a="http://schemas.openxmlformats.org/drawingml/2006/main" xmlns:r="http://schemas.openxmlformats.org/officeDocument/2006/relationships" xmlns:p="http://schemas.openxmlformats.org/presentationml/2006/main">
+  <p:cSld>
+    <p:spTree>
+      <p:nvGrpSpPr>
+        <p:cNvPr id="1" name=""/>
+        <p:cNvGrpSpPr/>
+        <p:nvPr/>
+      </p:nvGrpSpPr>
+      <p:grpSpPr>
+        <a:xfrm>
+          <a:off x="0" y="0"/>
+          <a:ext cx="0" cy="0"/>
+          <a:chOff x="0" y="0"/>
+          <a:chExt cx="0" cy="0"/>
+        </a:xfrm>
+      </p:grpSpPr>
+      <p:pic>
+        <p:nvPicPr>
+          <p:cNvPr id="2" name="Picture 1" descr="A picture containing background pattern&#10;&#10;Description automatically generated">
+            <a:extLst>
+              <a:ext uri="{FF2B5EF4-FFF2-40B4-BE49-F238E27FC236}">
+                <a16:creationId xmlns:a16="http://schemas.microsoft.com/office/drawing/2014/main" id="{E6102DFE-98A0-40B3-92F8-C9ADCC25DFF9}"/>
+              </a:ext>
+            </a:extLst>
+          </p:cNvPr>
+          <p:cNvPicPr>
+            <a:picLocks noChangeAspect="1"/>
+          </p:cNvPicPr>
+          <p:nvPr/>
+        </p:nvPicPr>
+        <p:blipFill>
+          <a:blip r:embed="rId2">
+            <a:extLst>
+              <a:ext uri="{28A0092B-C50C-407E-A947-70E740481C1C}">
+                <a14:useLocalDpi xmlns:a14="http://schemas.microsoft.com/office/drawing/2010/main" val="0"/>
+              </a:ext>
+            </a:extLst>
+          </a:blip>
+          <a:stretch>
+            <a:fillRect/>
+          </a:stretch>
+        </p:blipFill>
+        <p:spPr>
+          <a:xfrm>
+            <a:off x="-9331" y="0"/>
+            <a:ext cx="12192000" cy="6858000"/>
+          </a:xfrm>
+          <a:prstGeom prst="rect">
+            <a:avLst/>
+          </a:prstGeom>
+        </p:spPr>
+      </p:pic>
+      <p:sp>
+        <p:nvSpPr>
+          <p:cNvPr id="3" name="TextBox 2">
+            <a:extLst>
+              <a:ext uri="{FF2B5EF4-FFF2-40B4-BE49-F238E27FC236}">
+                <a16:creationId xmlns:a16="http://schemas.microsoft.com/office/drawing/2014/main" id="{1101E99B-239A-4EB2-B2C4-78834F8597A6}"/>
+              </a:ext>
+            </a:extLst>
+          </p:cNvPr>
+          <p:cNvSpPr txBox="1"/>
+          <p:nvPr/>
+        </p:nvSpPr>
+        <p:spPr>
+          <a:xfrm>
+            <a:off x="643813" y="186613"/>
+            <a:ext cx="1352938" cy="646331"/>
+          </a:xfrm>
+          <a:prstGeom prst="rect">
+            <a:avLst/>
+          </a:prstGeom>
+          <a:noFill/>
+        </p:spPr>
+        <p:txBody>
+          <a:bodyPr wrap="square" rtlCol="0">
+            <a:spAutoFit/>
+          </a:bodyPr>
+          <a:lstStyle/>
+          <a:p>
+            <a:r>
+              <a:rPr lang="en-US" sz="3600" b="1" dirty="0"/>
+              <a:t>00:59</a:t>
+            </a:r>
+          </a:p>
+        </p:txBody>
+      </p:sp>
+    </p:spTree>
+    <p:extLst>
+      <p:ext uri="{BB962C8B-B14F-4D97-AF65-F5344CB8AC3E}">
+        <p14:creationId xmlns:p14="http://schemas.microsoft.com/office/powerpoint/2010/main" val="2809438000"/>
+      </p:ext>
+    </p:extLst>
+  </p:cSld>
+  <p:clrMapOvr>
+    <a:masterClrMapping/>
+  </p:clrMapOvr>
+</p:sld>
+</file>
+
+<file path=ppt/slides/slide7.xml><?xml version="1.0" encoding="utf-8"?>
+<p:sld xmlns:a="http://schemas.openxmlformats.org/drawingml/2006/main" xmlns:r="http://schemas.openxmlformats.org/officeDocument/2006/relationships" xmlns:p="http://schemas.openxmlformats.org/presentationml/2006/main">
+  <p:cSld>
+    <p:spTree>
+      <p:nvGrpSpPr>
+        <p:cNvPr id="1" name=""/>
+        <p:cNvGrpSpPr/>
+        <p:nvPr/>
+      </p:nvGrpSpPr>
+      <p:grpSpPr>
+        <a:xfrm>
+          <a:off x="0" y="0"/>
+          <a:ext cx="0" cy="0"/>
+          <a:chOff x="0" y="0"/>
+          <a:chExt cx="0" cy="0"/>
+        </a:xfrm>
+      </p:grpSpPr>
+      <p:pic>
+        <p:nvPicPr>
+          <p:cNvPr id="2" name="Picture 1" descr="A picture containing background pattern&#10;&#10;Description automatically generated">
+            <a:extLst>
+              <a:ext uri="{FF2B5EF4-FFF2-40B4-BE49-F238E27FC236}">
+                <a16:creationId xmlns:a16="http://schemas.microsoft.com/office/drawing/2014/main" id="{0B45B9A4-25DA-4218-BC35-DE71A48A94F7}"/>
+              </a:ext>
+            </a:extLst>
+          </p:cNvPr>
+          <p:cNvPicPr>
+            <a:picLocks noChangeAspect="1"/>
+          </p:cNvPicPr>
+          <p:nvPr/>
+        </p:nvPicPr>
+        <p:blipFill>
+          <a:blip r:embed="rId2">
+            <a:extLst>
+              <a:ext uri="{28A0092B-C50C-407E-A947-70E740481C1C}">
+                <a14:useLocalDpi xmlns:a14="http://schemas.microsoft.com/office/drawing/2010/main" val="0"/>
+              </a:ext>
+            </a:extLst>
+          </a:blip>
+          <a:stretch>
+            <a:fillRect/>
+          </a:stretch>
+        </p:blipFill>
+        <p:spPr>
+          <a:xfrm>
+            <a:off x="-9331" y="0"/>
+            <a:ext cx="12192000" cy="6858000"/>
+          </a:xfrm>
+          <a:prstGeom prst="rect">
+            <a:avLst/>
+          </a:prstGeom>
+        </p:spPr>
+      </p:pic>
+      <p:sp>
+        <p:nvSpPr>
+          <p:cNvPr id="3" name="Rectangle 2">
+            <a:extLst>
+              <a:ext uri="{FF2B5EF4-FFF2-40B4-BE49-F238E27FC236}">
+                <a16:creationId xmlns:a16="http://schemas.microsoft.com/office/drawing/2014/main" id="{8DC5F296-3FBD-4FF8-9EC3-2A4CD7A0A52E}"/>
+              </a:ext>
+            </a:extLst>
+          </p:cNvPr>
+          <p:cNvSpPr/>
+          <p:nvPr/>
+        </p:nvSpPr>
+        <p:spPr>
+          <a:xfrm>
+            <a:off x="3144416" y="2080727"/>
+            <a:ext cx="4581331" cy="1147665"/>
+          </a:xfrm>
+          <a:prstGeom prst="rect">
+            <a:avLst/>
+          </a:prstGeom>
+          <a:solidFill>
+            <a:srgbClr val="F0C218"/>
+          </a:solidFill>
+          <a:ln w="57150">
+            <a:solidFill>
+              <a:schemeClr val="tx1"/>
+            </a:solidFill>
+            <a:extLst>
+              <a:ext uri="{C807C97D-BFC1-408E-A445-0C87EB9F89A2}">
+                <ask:lineSketchStyleProps xmlns:ask="http://schemas.microsoft.com/office/drawing/2018/sketchyshapes" sd="981765707">
+                  <a:custGeom>
+                    <a:avLst/>
+                    <a:gdLst>
+                      <a:gd name="connsiteX0" fmla="*/ 0 w 4581331"/>
+                      <a:gd name="connsiteY0" fmla="*/ 0 h 1147665"/>
+                      <a:gd name="connsiteX1" fmla="*/ 4581331 w 4581331"/>
+                      <a:gd name="connsiteY1" fmla="*/ 0 h 1147665"/>
+                      <a:gd name="connsiteX2" fmla="*/ 4581331 w 4581331"/>
+                      <a:gd name="connsiteY2" fmla="*/ 1147665 h 1147665"/>
+                      <a:gd name="connsiteX3" fmla="*/ 0 w 4581331"/>
+                      <a:gd name="connsiteY3" fmla="*/ 1147665 h 1147665"/>
+                      <a:gd name="connsiteX4" fmla="*/ 0 w 4581331"/>
+                      <a:gd name="connsiteY4" fmla="*/ 0 h 1147665"/>
+                    </a:gdLst>
+                    <a:ahLst/>
+                    <a:cxnLst>
+                      <a:cxn ang="0">
+                        <a:pos x="connsiteX0" y="connsiteY0"/>
+                      </a:cxn>
+                      <a:cxn ang="0">
+                        <a:pos x="connsiteX1" y="connsiteY1"/>
+                      </a:cxn>
+                      <a:cxn ang="0">
+                        <a:pos x="connsiteX2" y="connsiteY2"/>
+                      </a:cxn>
+                      <a:cxn ang="0">
+                        <a:pos x="connsiteX3" y="connsiteY3"/>
+                      </a:cxn>
+                      <a:cxn ang="0">
+                        <a:pos x="connsiteX4" y="connsiteY4"/>
+                      </a:cxn>
+                    </a:cxnLst>
+                    <a:rect l="l" t="t" r="r" b="b"/>
+                    <a:pathLst>
+                      <a:path w="4581331" h="1147665" fill="none" extrusionOk="0">
+                        <a:moveTo>
+                          <a:pt x="0" y="0"/>
+                        </a:moveTo>
+                        <a:cubicBezTo>
+                          <a:pt x="1020480" y="-33775"/>
+                          <a:pt x="3427038" y="138873"/>
+                          <a:pt x="4581331" y="0"/>
+                        </a:cubicBezTo>
+                        <a:cubicBezTo>
+                          <a:pt x="4626422" y="462542"/>
+                          <a:pt x="4611931" y="748487"/>
+                          <a:pt x="4581331" y="1147665"/>
+                        </a:cubicBezTo>
+                        <a:cubicBezTo>
+                          <a:pt x="2952570" y="1010335"/>
+                          <a:pt x="1703971" y="1009809"/>
+                          <a:pt x="0" y="1147665"/>
+                        </a:cubicBezTo>
+                        <a:cubicBezTo>
+                          <a:pt x="-62946" y="856010"/>
+                          <a:pt x="98769" y="345471"/>
+                          <a:pt x="0" y="0"/>
+                        </a:cubicBezTo>
+                        <a:close/>
+                      </a:path>
+                      <a:path w="4581331" h="1147665" stroke="0" extrusionOk="0">
+                        <a:moveTo>
+                          <a:pt x="0" y="0"/>
+                        </a:moveTo>
+                        <a:cubicBezTo>
+                          <a:pt x="1444276" y="-101487"/>
+                          <a:pt x="3820104" y="-162162"/>
+                          <a:pt x="4581331" y="0"/>
+                        </a:cubicBezTo>
+                        <a:cubicBezTo>
+                          <a:pt x="4630856" y="404607"/>
+                          <a:pt x="4538588" y="846551"/>
+                          <a:pt x="4581331" y="1147665"/>
+                        </a:cubicBezTo>
+                        <a:cubicBezTo>
+                          <a:pt x="3593697" y="1197730"/>
+                          <a:pt x="1235187" y="989216"/>
+                          <a:pt x="0" y="1147665"/>
+                        </a:cubicBezTo>
+                        <a:cubicBezTo>
+                          <a:pt x="96527" y="628113"/>
+                          <a:pt x="-14520" y="336753"/>
+                          <a:pt x="0" y="0"/>
+                        </a:cubicBezTo>
+                        <a:close/>
+                      </a:path>
+                    </a:pathLst>
+                  </a:custGeom>
+                  <ask:type>
+                    <ask:lineSketchNone/>
+                  </ask:type>
+                </ask:lineSketchStyleProps>
+              </a:ext>
+            </a:extLst>
+          </a:ln>
+        </p:spPr>
+        <p:style>
+          <a:lnRef idx="2">
+            <a:schemeClr val="accent1">
+              <a:shade val="50000"/>
+            </a:schemeClr>
+          </a:lnRef>
+          <a:fillRef idx="1">
+            <a:schemeClr val="accent1"/>
+          </a:fillRef>
+          <a:effectRef idx="0">
+            <a:schemeClr val="accent1"/>
+          </a:effectRef>
+          <a:fontRef idx="minor">
+            <a:schemeClr val="lt1"/>
+          </a:fontRef>
+        </p:style>
+        <p:txBody>
+          <a:bodyPr rtlCol="0" anchor="ctr"/>
+          <a:lstStyle/>
+          <a:p>
+            <a:pPr algn="ctr"/>
+            <a:r>
+              <a:rPr lang="en-US" sz="5400" dirty="0"/>
+              <a:t>WIN !</a:t>
+            </a:r>
+          </a:p>
+        </p:txBody>
+      </p:sp>
+    </p:spTree>
+    <p:extLst>
+      <p:ext uri="{BB962C8B-B14F-4D97-AF65-F5344CB8AC3E}">
+        <p14:creationId xmlns:p14="http://schemas.microsoft.com/office/powerpoint/2010/main" val="1486112879"/>
+      </p:ext>
+    </p:extLst>
+  </p:cSld>
+  <p:clrMapOvr>
+    <a:masterClrMapping/>
+  </p:clrMapOvr>
+  <p:timing>
+    <p:tnLst>
+      <p:par>
+        <p:cTn id="1" dur="indefinite" restart="never" nodeType="tmRoot">
+          <p:childTnLst>
+            <p:seq concurrent="1" nextAc="seek">
+              <p:cTn id="2" dur="indefinite" nodeType="mainSeq">
+                <p:childTnLst>
+                  <p:par>
+                    <p:cTn id="3" fill="hold">
+                      <p:stCondLst>
+                        <p:cond delay="indefinite"/>
+                      </p:stCondLst>
+                      <p:childTnLst>
+                        <p:par>
+                          <p:cTn id="4" fill="hold">
+                            <p:stCondLst>
+                              <p:cond delay="0"/>
+                            </p:stCondLst>
+                            <p:childTnLst>
+                              <p:par>
+                                <p:cTn id="5" presetID="1" presetClass="entr" presetSubtype="0" fill="hold" nodeType="clickEffect">
+                                  <p:stCondLst>
+                                    <p:cond delay="0"/>
+                                  </p:stCondLst>
+                                  <p:childTnLst>
+                                    <p:set>
+                                      <p:cBhvr>
+                                        <p:cTn id="6" dur="1" fill="hold">
+                                          <p:stCondLst>
+                                            <p:cond delay="0"/>
+                                          </p:stCondLst>
+                                        </p:cTn>
+                                        <p:tgtEl>
+                                          <p:spTgt spid="2"/>
+                                        </p:tgtEl>
+                                        <p:attrNameLst>
+                                          <p:attrName>style.visibility</p:attrName>
+                                        </p:attrNameLst>
+                                      </p:cBhvr>
+                                      <p:to>
+                                        <p:strVal val="visible"/>
+                                      </p:to>
+                                    </p:set>
+                                  </p:childTnLst>
+                                </p:cTn>
+                              </p:par>
+                            </p:childTnLst>
+                          </p:cTn>
+                        </p:par>
+                      </p:childTnLst>
+                    </p:cTn>
+                  </p:par>
+                </p:childTnLst>
+              </p:cTn>
+              <p:prevCondLst>
+                <p:cond evt="onPrev" delay="0">
+                  <p:tgtEl>
+                    <p:sldTgt/>
+                  </p:tgtEl>
+                </p:cond>
+              </p:prevCondLst>
+              <p:nextCondLst>
+                <p:cond evt="onNext" delay="0">
+                  <p:tgtEl>
+                    <p:sldTgt/>
+                  </p:tgtEl>
+                </p:cond>
+              </p:nextCondLst>
+            </p:seq>
+          </p:childTnLst>
+        </p:cTn>
+      </p:par>
+    </p:tnLst>
+  </p:timing>
+</p:sld>
+</file>
+
 <file path=ppt/theme/theme1.xml><?xml version="1.0" encoding="utf-8"?>
 <a:theme xmlns:a="http://schemas.openxmlformats.org/drawingml/2006/main" name="Office Theme">
   <a:themeElements>

</xml_diff>

<commit_message>
JS - starting btn: start timer and move timer to left side
</commit_message>
<xml_diff>
--- a/plan/Where’s Wally.pptx
+++ b/plan/Where’s Wally.pptx
@@ -4096,11 +4096,16 @@
           <a:p>
             <a:r>
               <a:rPr lang="en-US" dirty="0"/>
-              <a:t>Increasing level, time will </a:t>
-            </a:r>
-            <a:r>
-              <a:rPr lang="en-US"/>
-              <a:t>be reduced.</a:t>
+              <a:t>Increasing level, time will be reduced.</a:t>
+            </a:r>
+          </a:p>
+          <a:p>
+            <a:endParaRPr lang="en-US" dirty="0"/>
+          </a:p>
+          <a:p>
+            <a:r>
+              <a:rPr lang="en-US"/>
+              <a:t>https://laughtonallsaints.org/storage/app/media/uploaded-files/wheres%20wally.pdf</a:t>
             </a:r>
             <a:endParaRPr lang="en-US" dirty="0"/>
           </a:p>

</xml_diff>

<commit_message>
JS - extra changes
</commit_message>
<xml_diff>
--- a/plan/Where’s Wally.pptx
+++ b/plan/Where’s Wally.pptx
@@ -276,7 +276,7 @@
           <a:p>
             <a:fld id="{07316937-9BBB-49D0-AFC6-014B7C792571}" type="datetimeFigureOut">
               <a:rPr lang="en-US" smtClean="0"/>
-              <a:t>8/17/2021</a:t>
+              <a:t>8/18/2021</a:t>
             </a:fld>
             <a:endParaRPr lang="en-US"/>
           </a:p>
@@ -474,7 +474,7 @@
           <a:p>
             <a:fld id="{07316937-9BBB-49D0-AFC6-014B7C792571}" type="datetimeFigureOut">
               <a:rPr lang="en-US" smtClean="0"/>
-              <a:t>8/17/2021</a:t>
+              <a:t>8/18/2021</a:t>
             </a:fld>
             <a:endParaRPr lang="en-US"/>
           </a:p>
@@ -682,7 +682,7 @@
           <a:p>
             <a:fld id="{07316937-9BBB-49D0-AFC6-014B7C792571}" type="datetimeFigureOut">
               <a:rPr lang="en-US" smtClean="0"/>
-              <a:t>8/17/2021</a:t>
+              <a:t>8/18/2021</a:t>
             </a:fld>
             <a:endParaRPr lang="en-US"/>
           </a:p>
@@ -880,7 +880,7 @@
           <a:p>
             <a:fld id="{07316937-9BBB-49D0-AFC6-014B7C792571}" type="datetimeFigureOut">
               <a:rPr lang="en-US" smtClean="0"/>
-              <a:t>8/17/2021</a:t>
+              <a:t>8/18/2021</a:t>
             </a:fld>
             <a:endParaRPr lang="en-US"/>
           </a:p>
@@ -1155,7 +1155,7 @@
           <a:p>
             <a:fld id="{07316937-9BBB-49D0-AFC6-014B7C792571}" type="datetimeFigureOut">
               <a:rPr lang="en-US" smtClean="0"/>
-              <a:t>8/17/2021</a:t>
+              <a:t>8/18/2021</a:t>
             </a:fld>
             <a:endParaRPr lang="en-US"/>
           </a:p>
@@ -1420,7 +1420,7 @@
           <a:p>
             <a:fld id="{07316937-9BBB-49D0-AFC6-014B7C792571}" type="datetimeFigureOut">
               <a:rPr lang="en-US" smtClean="0"/>
-              <a:t>8/17/2021</a:t>
+              <a:t>8/18/2021</a:t>
             </a:fld>
             <a:endParaRPr lang="en-US"/>
           </a:p>
@@ -1832,7 +1832,7 @@
           <a:p>
             <a:fld id="{07316937-9BBB-49D0-AFC6-014B7C792571}" type="datetimeFigureOut">
               <a:rPr lang="en-US" smtClean="0"/>
-              <a:t>8/17/2021</a:t>
+              <a:t>8/18/2021</a:t>
             </a:fld>
             <a:endParaRPr lang="en-US"/>
           </a:p>
@@ -1973,7 +1973,7 @@
           <a:p>
             <a:fld id="{07316937-9BBB-49D0-AFC6-014B7C792571}" type="datetimeFigureOut">
               <a:rPr lang="en-US" smtClean="0"/>
-              <a:t>8/17/2021</a:t>
+              <a:t>8/18/2021</a:t>
             </a:fld>
             <a:endParaRPr lang="en-US"/>
           </a:p>
@@ -2086,7 +2086,7 @@
           <a:p>
             <a:fld id="{07316937-9BBB-49D0-AFC6-014B7C792571}" type="datetimeFigureOut">
               <a:rPr lang="en-US" smtClean="0"/>
-              <a:t>8/17/2021</a:t>
+              <a:t>8/18/2021</a:t>
             </a:fld>
             <a:endParaRPr lang="en-US"/>
           </a:p>
@@ -2397,7 +2397,7 @@
           <a:p>
             <a:fld id="{07316937-9BBB-49D0-AFC6-014B7C792571}" type="datetimeFigureOut">
               <a:rPr lang="en-US" smtClean="0"/>
-              <a:t>8/17/2021</a:t>
+              <a:t>8/18/2021</a:t>
             </a:fld>
             <a:endParaRPr lang="en-US"/>
           </a:p>
@@ -2685,7 +2685,7 @@
           <a:p>
             <a:fld id="{07316937-9BBB-49D0-AFC6-014B7C792571}" type="datetimeFigureOut">
               <a:rPr lang="en-US" smtClean="0"/>
-              <a:t>8/17/2021</a:t>
+              <a:t>8/18/2021</a:t>
             </a:fld>
             <a:endParaRPr lang="en-US"/>
           </a:p>
@@ -2926,7 +2926,7 @@
           <a:p>
             <a:fld id="{07316937-9BBB-49D0-AFC6-014B7C792571}" type="datetimeFigureOut">
               <a:rPr lang="en-US" smtClean="0"/>
-              <a:t>8/17/2021</a:t>
+              <a:t>8/18/2021</a:t>
             </a:fld>
             <a:endParaRPr lang="en-US"/>
           </a:p>
@@ -4532,7 +4532,7 @@
         </p:blipFill>
         <p:spPr>
           <a:xfrm>
-            <a:off x="-9331" y="0"/>
+            <a:off x="0" y="0"/>
             <a:ext cx="12192000" cy="6858000"/>
           </a:xfrm>
           <a:prstGeom prst="rect">
@@ -4554,7 +4554,7 @@
         </p:nvSpPr>
         <p:spPr>
           <a:xfrm>
-            <a:off x="643813" y="186613"/>
+            <a:off x="653143" y="509778"/>
             <a:ext cx="1352938" cy="646331"/>
           </a:xfrm>
           <a:prstGeom prst="rect">
@@ -4571,6 +4571,82 @@
             <a:r>
               <a:rPr lang="en-US" sz="3600" b="1" dirty="0"/>
               <a:t>00:59</a:t>
+            </a:r>
+          </a:p>
+        </p:txBody>
+      </p:sp>
+      <p:sp>
+        <p:nvSpPr>
+          <p:cNvPr id="4" name="TextBox 3">
+            <a:extLst>
+              <a:ext uri="{FF2B5EF4-FFF2-40B4-BE49-F238E27FC236}">
+                <a16:creationId xmlns:a16="http://schemas.microsoft.com/office/drawing/2014/main" id="{54AA7CCE-43B1-4619-A130-70BDDE3A0949}"/>
+              </a:ext>
+            </a:extLst>
+          </p:cNvPr>
+          <p:cNvSpPr txBox="1"/>
+          <p:nvPr/>
+        </p:nvSpPr>
+        <p:spPr>
+          <a:xfrm>
+            <a:off x="1894113" y="648277"/>
+            <a:ext cx="765111" cy="369332"/>
+          </a:xfrm>
+          <a:prstGeom prst="rect">
+            <a:avLst/>
+          </a:prstGeom>
+          <a:noFill/>
+        </p:spPr>
+        <p:txBody>
+          <a:bodyPr wrap="square" rtlCol="0">
+            <a:spAutoFit/>
+          </a:bodyPr>
+          <a:lstStyle/>
+          <a:p>
+            <a:r>
+              <a:rPr lang="ko-KR" altLang="en-US" dirty="0"/>
+              <a:t>❌</a:t>
+            </a:r>
+            <a:endParaRPr lang="en-US" dirty="0"/>
+          </a:p>
+        </p:txBody>
+      </p:sp>
+      <p:sp>
+        <p:nvSpPr>
+          <p:cNvPr id="5" name="TextBox 4">
+            <a:extLst>
+              <a:ext uri="{FF2B5EF4-FFF2-40B4-BE49-F238E27FC236}">
+                <a16:creationId xmlns:a16="http://schemas.microsoft.com/office/drawing/2014/main" id="{3776D293-656A-4446-9990-19459C043B68}"/>
+              </a:ext>
+            </a:extLst>
+          </p:cNvPr>
+          <p:cNvSpPr txBox="1"/>
+          <p:nvPr/>
+        </p:nvSpPr>
+        <p:spPr>
+          <a:xfrm>
+            <a:off x="464976" y="-5748"/>
+            <a:ext cx="2278224" cy="584775"/>
+          </a:xfrm>
+          <a:prstGeom prst="rect">
+            <a:avLst/>
+          </a:prstGeom>
+          <a:noFill/>
+          <a:ln>
+            <a:solidFill>
+              <a:schemeClr val="tx1"/>
+            </a:solidFill>
+          </a:ln>
+        </p:spPr>
+        <p:txBody>
+          <a:bodyPr wrap="square" rtlCol="0">
+            <a:spAutoFit/>
+          </a:bodyPr>
+          <a:lstStyle/>
+          <a:p>
+            <a:r>
+              <a:rPr lang="en-US" sz="3200" dirty="0"/>
+              <a:t> Level 01</a:t>
             </a:r>
           </a:p>
         </p:txBody>

</xml_diff>